<commit_message>
studying how to program FCN with pytorch
</commit_message>
<xml_diff>
--- a/Deconvolution Net.pptx
+++ b/Deconvolution Net.pptx
@@ -251,7 +251,7 @@
           <a:p>
             <a:fld id="{16F3CBEB-74AD-4BF4-B88A-2BEB28D2B57D}" type="datetimeFigureOut">
               <a:rPr lang="ko-KR" altLang="en-US" smtClean="0"/>
-              <a:t>2021-01-30</a:t>
+              <a:t>2021-02-01</a:t>
             </a:fld>
             <a:endParaRPr lang="ko-KR" altLang="en-US"/>
           </a:p>
@@ -421,7 +421,7 @@
           <a:p>
             <a:fld id="{16F3CBEB-74AD-4BF4-B88A-2BEB28D2B57D}" type="datetimeFigureOut">
               <a:rPr lang="ko-KR" altLang="en-US" smtClean="0"/>
-              <a:t>2021-01-30</a:t>
+              <a:t>2021-02-01</a:t>
             </a:fld>
             <a:endParaRPr lang="ko-KR" altLang="en-US"/>
           </a:p>
@@ -601,7 +601,7 @@
           <a:p>
             <a:fld id="{16F3CBEB-74AD-4BF4-B88A-2BEB28D2B57D}" type="datetimeFigureOut">
               <a:rPr lang="ko-KR" altLang="en-US" smtClean="0"/>
-              <a:t>2021-01-30</a:t>
+              <a:t>2021-02-01</a:t>
             </a:fld>
             <a:endParaRPr lang="ko-KR" altLang="en-US"/>
           </a:p>
@@ -771,7 +771,7 @@
           <a:p>
             <a:fld id="{16F3CBEB-74AD-4BF4-B88A-2BEB28D2B57D}" type="datetimeFigureOut">
               <a:rPr lang="ko-KR" altLang="en-US" smtClean="0"/>
-              <a:t>2021-01-30</a:t>
+              <a:t>2021-02-01</a:t>
             </a:fld>
             <a:endParaRPr lang="ko-KR" altLang="en-US"/>
           </a:p>
@@ -1017,7 +1017,7 @@
           <a:p>
             <a:fld id="{16F3CBEB-74AD-4BF4-B88A-2BEB28D2B57D}" type="datetimeFigureOut">
               <a:rPr lang="ko-KR" altLang="en-US" smtClean="0"/>
-              <a:t>2021-01-30</a:t>
+              <a:t>2021-02-01</a:t>
             </a:fld>
             <a:endParaRPr lang="ko-KR" altLang="en-US"/>
           </a:p>
@@ -1249,7 +1249,7 @@
           <a:p>
             <a:fld id="{16F3CBEB-74AD-4BF4-B88A-2BEB28D2B57D}" type="datetimeFigureOut">
               <a:rPr lang="ko-KR" altLang="en-US" smtClean="0"/>
-              <a:t>2021-01-30</a:t>
+              <a:t>2021-02-01</a:t>
             </a:fld>
             <a:endParaRPr lang="ko-KR" altLang="en-US"/>
           </a:p>
@@ -1616,7 +1616,7 @@
           <a:p>
             <a:fld id="{16F3CBEB-74AD-4BF4-B88A-2BEB28D2B57D}" type="datetimeFigureOut">
               <a:rPr lang="ko-KR" altLang="en-US" smtClean="0"/>
-              <a:t>2021-01-30</a:t>
+              <a:t>2021-02-01</a:t>
             </a:fld>
             <a:endParaRPr lang="ko-KR" altLang="en-US"/>
           </a:p>
@@ -1734,7 +1734,7 @@
           <a:p>
             <a:fld id="{16F3CBEB-74AD-4BF4-B88A-2BEB28D2B57D}" type="datetimeFigureOut">
               <a:rPr lang="ko-KR" altLang="en-US" smtClean="0"/>
-              <a:t>2021-01-30</a:t>
+              <a:t>2021-02-01</a:t>
             </a:fld>
             <a:endParaRPr lang="ko-KR" altLang="en-US"/>
           </a:p>
@@ -1829,7 +1829,7 @@
           <a:p>
             <a:fld id="{16F3CBEB-74AD-4BF4-B88A-2BEB28D2B57D}" type="datetimeFigureOut">
               <a:rPr lang="ko-KR" altLang="en-US" smtClean="0"/>
-              <a:t>2021-01-30</a:t>
+              <a:t>2021-02-01</a:t>
             </a:fld>
             <a:endParaRPr lang="ko-KR" altLang="en-US"/>
           </a:p>
@@ -2106,7 +2106,7 @@
           <a:p>
             <a:fld id="{16F3CBEB-74AD-4BF4-B88A-2BEB28D2B57D}" type="datetimeFigureOut">
               <a:rPr lang="ko-KR" altLang="en-US" smtClean="0"/>
-              <a:t>2021-01-30</a:t>
+              <a:t>2021-02-01</a:t>
             </a:fld>
             <a:endParaRPr lang="ko-KR" altLang="en-US"/>
           </a:p>
@@ -2359,7 +2359,7 @@
           <a:p>
             <a:fld id="{16F3CBEB-74AD-4BF4-B88A-2BEB28D2B57D}" type="datetimeFigureOut">
               <a:rPr lang="ko-KR" altLang="en-US" smtClean="0"/>
-              <a:t>2021-01-30</a:t>
+              <a:t>2021-02-01</a:t>
             </a:fld>
             <a:endParaRPr lang="ko-KR" altLang="en-US"/>
           </a:p>
@@ -2572,7 +2572,7 @@
           <a:p>
             <a:fld id="{16F3CBEB-74AD-4BF4-B88A-2BEB28D2B57D}" type="datetimeFigureOut">
               <a:rPr lang="ko-KR" altLang="en-US" smtClean="0"/>
-              <a:t>2021-01-30</a:t>
+              <a:t>2021-02-01</a:t>
             </a:fld>
             <a:endParaRPr lang="ko-KR" altLang="en-US"/>
           </a:p>

</xml_diff>